<commit_message>
update clean code y presentacion hx
</commit_message>
<xml_diff>
--- a/Presentaciones/1 - Presentacion Hexacta.pptx
+++ b/Presentaciones/1 - Presentacion Hexacta.pptx
@@ -279,7 +279,7 @@
               <a:pPr>
                 <a:defRPr/>
               </a:pPr>
-              <a:t>10-Sep-15</a:t>
+              <a:t>22-Mar-16</a:t>
             </a:fld>
             <a:endParaRPr lang="en-US"/>
           </a:p>
@@ -474,7 +474,7 @@
               <a:pPr>
                 <a:defRPr/>
               </a:pPr>
-              <a:t>10-Sep-15</a:t>
+              <a:t>22-Mar-16</a:t>
             </a:fld>
             <a:endParaRPr lang="en-US"/>
           </a:p>
@@ -6037,11 +6037,15 @@
           <a:p>
             <a:r>
               <a:rPr lang="es-AR" sz="2800" dirty="0"/>
-              <a:t>Curso .NET y ASP </a:t>
-            </a:r>
-            <a:r>
-              <a:rPr lang="es-AR" sz="2800" dirty="0" smtClean="0"/>
-              <a:t>MVC4</a:t>
+              <a:t>Curso .NET y </a:t>
+            </a:r>
+            <a:r>
+              <a:rPr lang="es-AR" sz="2800"/>
+              <a:t>ASP </a:t>
+            </a:r>
+            <a:r>
+              <a:rPr lang="es-AR" sz="2800" smtClean="0"/>
+              <a:t>MVC5</a:t>
             </a:r>
             <a:endParaRPr lang="es-AR" sz="2800" dirty="0"/>
           </a:p>
@@ -6063,12 +6067,8 @@
           <a:lstStyle/>
           <a:p>
             <a:r>
-              <a:rPr lang="en-US" dirty="0" err="1" smtClean="0"/>
-              <a:t>Septiembre</a:t>
-            </a:r>
-            <a:r>
-              <a:rPr lang="en-US" dirty="0" smtClean="0"/>
-              <a:t> 2015</a:t>
+              <a:rPr lang="en-US" smtClean="0"/>
+              <a:t>Marzo 2016</a:t>
             </a:r>
             <a:endParaRPr lang="en-US" dirty="0"/>
           </a:p>
@@ -6243,29 +6243,7 @@
                   </a:schemeClr>
                 </a:solidFill>
               </a:rPr>
-              <a:t>Sumamos cerca de </a:t>
-            </a:r>
-            <a:r>
-              <a:rPr lang="es-ES" sz="1400" dirty="0">
-                <a:solidFill>
-                  <a:schemeClr val="tx1">
-                    <a:lumMod val="50000"/>
-                    <a:lumOff val="50000"/>
-                  </a:schemeClr>
-                </a:solidFill>
-              </a:rPr>
-              <a:t>320 </a:t>
-            </a:r>
-            <a:r>
-              <a:rPr lang="es-ES" sz="1400" dirty="0">
-                <a:solidFill>
-                  <a:schemeClr val="tx1">
-                    <a:lumMod val="50000"/>
-                    <a:lumOff val="50000"/>
-                  </a:schemeClr>
-                </a:solidFill>
-              </a:rPr>
-              <a:t>personas, en nuestras oficinas de Buenos Aires, La Plata, Bahía Blanca, Paraná (Argentina) y Montevideo (Uruguay)</a:t>
+              <a:t>Sumamos cerca de 320 personas, en nuestras oficinas de Buenos Aires, La Plata, Bahía Blanca, Paraná (Argentina) y Montevideo (Uruguay)</a:t>
             </a:r>
           </a:p>
           <a:p>
@@ -9125,7 +9103,7 @@
           <p:nvPr>
             <p:extLst>
               <p:ext uri="{D42A27DB-BD31-4B8C-83A1-F6EECF244321}">
-                <p14:modId xmlns:p14="http://schemas.microsoft.com/office/powerpoint/2010/main" val="80509341"/>
+                <p14:modId xmlns:p14="http://schemas.microsoft.com/office/powerpoint/2010/main" val="1680377156"/>
               </p:ext>
             </p:extLst>
           </p:nvPr>
@@ -9295,7 +9273,7 @@
                     <a:p>
                       <a:pPr algn="ctr"/>
                       <a:r>
-                        <a:rPr lang="es-ES_tradnl" sz="1500" b="1" dirty="0" smtClean="0">
+                        <a:rPr lang="es-ES_tradnl" sz="1500" b="1" smtClean="0">
                           <a:solidFill>
                             <a:schemeClr val="tx1">
                               <a:lumMod val="50000"/>
@@ -9303,10 +9281,10 @@
                             </a:schemeClr>
                           </a:solidFill>
                         </a:rPr>
-                        <a:t>Martes 15</a:t>
+                        <a:t>Martes </a:t>
                       </a:r>
                       <a:r>
-                        <a:rPr lang="es-ES_tradnl" sz="1500" b="1" baseline="0" dirty="0" smtClean="0">
+                        <a:rPr lang="es-ES_tradnl" sz="1500" b="1" smtClean="0">
                           <a:solidFill>
                             <a:schemeClr val="tx1">
                               <a:lumMod val="50000"/>
@@ -9314,7 +9292,18 @@
                             </a:schemeClr>
                           </a:solidFill>
                         </a:rPr>
-                        <a:t>/09</a:t>
+                        <a:t>29</a:t>
+                      </a:r>
+                      <a:r>
+                        <a:rPr lang="es-ES_tradnl" sz="1500" b="1" baseline="0" smtClean="0">
+                          <a:solidFill>
+                            <a:schemeClr val="tx1">
+                              <a:lumMod val="50000"/>
+                              <a:lumOff val="50000"/>
+                            </a:schemeClr>
+                          </a:solidFill>
+                        </a:rPr>
+                        <a:t>/03</a:t>
                       </a:r>
                       <a:endParaRPr lang="en-US" sz="1500" b="1" dirty="0">
                         <a:solidFill>
@@ -9383,8 +9372,38 @@
                             </a:schemeClr>
                           </a:solidFill>
                         </a:rPr>
-                        <a:t> + .NET</a:t>
+                        <a:t> </a:t>
                       </a:r>
+                      <a:r>
+                        <a:rPr lang="es-ES_tradnl" sz="1500" smtClean="0">
+                          <a:solidFill>
+                            <a:schemeClr val="tx1">
+                              <a:lumMod val="50000"/>
+                              <a:lumOff val="50000"/>
+                            </a:schemeClr>
+                          </a:solidFill>
+                        </a:rPr>
+                        <a:t>+ </a:t>
+                      </a:r>
+                      <a:r>
+                        <a:rPr lang="es-ES_tradnl" sz="1500" smtClean="0">
+                          <a:solidFill>
+                            <a:schemeClr val="tx1">
+                              <a:lumMod val="50000"/>
+                              <a:lumOff val="50000"/>
+                            </a:schemeClr>
+                          </a:solidFill>
+                        </a:rPr>
+                        <a:t>POO</a:t>
+                      </a:r>
+                      <a:endParaRPr lang="es-ES_tradnl" sz="1500" dirty="0" smtClean="0">
+                        <a:solidFill>
+                          <a:schemeClr val="tx1">
+                            <a:lumMod val="50000"/>
+                            <a:lumOff val="50000"/>
+                          </a:schemeClr>
+                        </a:solidFill>
+                      </a:endParaRPr>
                     </a:p>
                   </a:txBody>
                   <a:tcPr anchor="ctr">
@@ -9440,7 +9459,7 @@
                     <a:p>
                       <a:pPr algn="ctr"/>
                       <a:r>
-                        <a:rPr lang="es-ES_tradnl" sz="1500" b="1" dirty="0" smtClean="0">
+                        <a:rPr lang="es-ES_tradnl" sz="1500" b="1" smtClean="0">
                           <a:solidFill>
                             <a:schemeClr val="tx1">
                               <a:lumMod val="50000"/>
@@ -9448,10 +9467,10 @@
                             </a:schemeClr>
                           </a:solidFill>
                         </a:rPr>
-                        <a:t>Jueves 17</a:t>
+                        <a:t>Jueves </a:t>
                       </a:r>
                       <a:r>
-                        <a:rPr lang="es-ES_tradnl" sz="1500" b="1" baseline="0" dirty="0" smtClean="0">
+                        <a:rPr lang="es-ES_tradnl" sz="1500" b="1" smtClean="0">
                           <a:solidFill>
                             <a:schemeClr val="tx1">
                               <a:lumMod val="50000"/>
@@ -9459,7 +9478,18 @@
                             </a:schemeClr>
                           </a:solidFill>
                         </a:rPr>
-                        <a:t>/09</a:t>
+                        <a:t>31</a:t>
+                      </a:r>
+                      <a:r>
+                        <a:rPr lang="es-ES_tradnl" sz="1500" b="1" baseline="0" smtClean="0">
+                          <a:solidFill>
+                            <a:schemeClr val="tx1">
+                              <a:lumMod val="50000"/>
+                              <a:lumOff val="50000"/>
+                            </a:schemeClr>
+                          </a:solidFill>
+                        </a:rPr>
+                        <a:t>/03</a:t>
                       </a:r>
                       <a:endParaRPr lang="en-US" sz="1500" b="1" dirty="0">
                         <a:solidFill>
@@ -9496,7 +9526,7 @@
                         <a:defRPr/>
                       </a:pPr>
                       <a:r>
-                        <a:rPr lang="es-ES_tradnl" sz="1500" kern="1200" dirty="0" smtClean="0">
+                        <a:rPr lang="es-ES_tradnl" sz="1500" kern="1200" smtClean="0">
                           <a:solidFill>
                             <a:schemeClr val="tx1">
                               <a:lumMod val="50000"/>
@@ -9507,35 +9537,7 @@
                           <a:ea typeface="+mn-ea"/>
                           <a:cs typeface="+mn-cs"/>
                         </a:rPr>
-                        <a:t>Práctica</a:t>
-                      </a:r>
-                      <a:r>
-                        <a:rPr lang="es-ES_tradnl" sz="1500" kern="1200" baseline="0" dirty="0" smtClean="0">
-                          <a:solidFill>
-                            <a:schemeClr val="tx1">
-                              <a:lumMod val="50000"/>
-                              <a:lumOff val="50000"/>
-                            </a:schemeClr>
-                          </a:solidFill>
-                          <a:latin typeface="+mn-lt"/>
-                          <a:ea typeface="+mn-ea"/>
-                          <a:cs typeface="+mn-cs"/>
-                        </a:rPr>
-                        <a:t> Aplicaciones web con </a:t>
-                      </a:r>
-                      <a:r>
-                        <a:rPr lang="es-ES_tradnl" sz="1500" kern="1200" dirty="0" smtClean="0">
-                          <a:solidFill>
-                            <a:schemeClr val="tx1">
-                              <a:lumMod val="50000"/>
-                              <a:lumOff val="50000"/>
-                            </a:schemeClr>
-                          </a:solidFill>
-                          <a:latin typeface="+mn-lt"/>
-                          <a:ea typeface="+mn-ea"/>
-                          <a:cs typeface="+mn-cs"/>
-                        </a:rPr>
-                        <a:t>MVC4 - 1/5</a:t>
+                        <a:t>.NET, C#</a:t>
                       </a:r>
                       <a:endParaRPr lang="es-ES_tradnl" sz="1500" dirty="0" smtClean="0">
                         <a:solidFill>
@@ -9593,7 +9595,7 @@
                     <a:p>
                       <a:pPr marL="0" algn="ctr" defTabSz="914400" rtl="0" eaLnBrk="1" latinLnBrk="0" hangingPunct="1"/>
                       <a:r>
-                        <a:rPr lang="es-ES_tradnl" sz="1500" b="1" kern="1200" dirty="0" smtClean="0">
+                        <a:rPr lang="es-ES_tradnl" sz="1500" b="1" kern="1200" smtClean="0">
                           <a:solidFill>
                             <a:schemeClr val="tx1">
                               <a:lumMod val="50000"/>
@@ -9607,7 +9609,7 @@
                         <a:t>Martes</a:t>
                       </a:r>
                       <a:r>
-                        <a:rPr lang="es-ES_tradnl" sz="1500" b="1" kern="1200" baseline="0" dirty="0" smtClean="0">
+                        <a:rPr lang="es-ES_tradnl" sz="1500" b="1" kern="1200" baseline="0" smtClean="0">
                           <a:solidFill>
                             <a:schemeClr val="tx1">
                               <a:lumMod val="50000"/>
@@ -9618,7 +9620,21 @@
                           <a:ea typeface="+mn-ea"/>
                           <a:cs typeface="+mn-cs"/>
                         </a:rPr>
-                        <a:t> 22/09</a:t>
+                        <a:t> </a:t>
+                      </a:r>
+                      <a:r>
+                        <a:rPr lang="es-ES_tradnl" sz="1500" b="1" kern="1200" baseline="0" smtClean="0">
+                          <a:solidFill>
+                            <a:schemeClr val="tx1">
+                              <a:lumMod val="50000"/>
+                              <a:lumOff val="50000"/>
+                            </a:schemeClr>
+                          </a:solidFill>
+                          <a:latin typeface="+mn-lt"/>
+                          <a:ea typeface="+mn-ea"/>
+                          <a:cs typeface="+mn-cs"/>
+                        </a:rPr>
+                        <a:t>4/04</a:t>
                       </a:r>
                       <a:endParaRPr lang="en-US" sz="1500" b="1" kern="1200" dirty="0">
                         <a:solidFill>
@@ -9674,10 +9690,10 @@
                           <a:ea typeface="+mn-ea"/>
                           <a:cs typeface="+mn-cs"/>
                         </a:rPr>
-                        <a:t> Aplicaciones web con </a:t>
+                        <a:t> Aplicaciones web </a:t>
                       </a:r>
                       <a:r>
-                        <a:rPr lang="es-ES_tradnl" sz="1500" kern="1200" dirty="0" smtClean="0">
+                        <a:rPr lang="es-ES_tradnl" sz="1500" kern="1200" baseline="0" smtClean="0">
                           <a:solidFill>
                             <a:schemeClr val="tx1">
                               <a:lumMod val="50000"/>
@@ -9688,7 +9704,49 @@
                           <a:ea typeface="+mn-ea"/>
                           <a:cs typeface="+mn-cs"/>
                         </a:rPr>
-                        <a:t>MVC4 - 2/5</a:t>
+                        <a:t>con </a:t>
+                      </a:r>
+                      <a:r>
+                        <a:rPr lang="es-ES_tradnl" sz="1500" kern="1200" smtClean="0">
+                          <a:solidFill>
+                            <a:schemeClr val="tx1">
+                              <a:lumMod val="50000"/>
+                              <a:lumOff val="50000"/>
+                            </a:schemeClr>
+                          </a:solidFill>
+                          <a:latin typeface="+mn-lt"/>
+                          <a:ea typeface="+mn-ea"/>
+                          <a:cs typeface="+mn-cs"/>
+                        </a:rPr>
+                        <a:t>MVC5 </a:t>
+                      </a:r>
+                      <a:r>
+                        <a:rPr lang="es-ES_tradnl" sz="1500" kern="1200" smtClean="0">
+                          <a:solidFill>
+                            <a:schemeClr val="tx1">
+                              <a:lumMod val="50000"/>
+                              <a:lumOff val="50000"/>
+                            </a:schemeClr>
+                          </a:solidFill>
+                          <a:latin typeface="+mn-lt"/>
+                          <a:ea typeface="+mn-ea"/>
+                          <a:cs typeface="+mn-cs"/>
+                        </a:rPr>
+                        <a:t>- </a:t>
+                      </a:r>
+                      <a:r>
+                        <a:rPr lang="es-ES_tradnl" sz="1500" kern="1200" smtClean="0">
+                          <a:solidFill>
+                            <a:schemeClr val="tx1">
+                              <a:lumMod val="50000"/>
+                              <a:lumOff val="50000"/>
+                            </a:schemeClr>
+                          </a:solidFill>
+                          <a:latin typeface="+mn-lt"/>
+                          <a:ea typeface="+mn-ea"/>
+                          <a:cs typeface="+mn-cs"/>
+                        </a:rPr>
+                        <a:t>1/4</a:t>
                       </a:r>
                       <a:endParaRPr lang="en-US" sz="1500" kern="1200" dirty="0">
                         <a:solidFill>
@@ -9756,7 +9814,7 @@
                     <a:p>
                       <a:pPr algn="ctr"/>
                       <a:r>
-                        <a:rPr lang="es-ES_tradnl" sz="1500" b="1" dirty="0" smtClean="0">
+                        <a:rPr lang="es-ES_tradnl" sz="1500" b="1" smtClean="0">
                           <a:solidFill>
                             <a:schemeClr val="tx1">
                               <a:lumMod val="50000"/>
@@ -9764,7 +9822,18 @@
                             </a:schemeClr>
                           </a:solidFill>
                         </a:rPr>
-                        <a:t>Jueves 24/09</a:t>
+                        <a:t>Jueves </a:t>
+                      </a:r>
+                      <a:r>
+                        <a:rPr lang="es-ES_tradnl" sz="1500" b="1" smtClean="0">
+                          <a:solidFill>
+                            <a:schemeClr val="tx1">
+                              <a:lumMod val="50000"/>
+                              <a:lumOff val="50000"/>
+                            </a:schemeClr>
+                          </a:solidFill>
+                        </a:rPr>
+                        <a:t>7/04</a:t>
                       </a:r>
                       <a:endParaRPr lang="en-US" sz="1500" b="1" dirty="0">
                         <a:solidFill>
@@ -9810,10 +9879,10 @@
                           <a:ea typeface="+mn-ea"/>
                           <a:cs typeface="+mn-cs"/>
                         </a:rPr>
-                        <a:t> Aplicaciones web con </a:t>
+                        <a:t> Aplicaciones web </a:t>
                       </a:r>
                       <a:r>
-                        <a:rPr lang="es-ES_tradnl" sz="1500" kern="1200" dirty="0" smtClean="0">
+                        <a:rPr lang="es-ES_tradnl" sz="1500" kern="1200" baseline="0" smtClean="0">
                           <a:solidFill>
                             <a:schemeClr val="tx1">
                               <a:lumMod val="50000"/>
@@ -9824,7 +9893,49 @@
                           <a:ea typeface="+mn-ea"/>
                           <a:cs typeface="+mn-cs"/>
                         </a:rPr>
-                        <a:t>MVC4 - 3/5</a:t>
+                        <a:t>con </a:t>
+                      </a:r>
+                      <a:r>
+                        <a:rPr lang="es-ES_tradnl" sz="1500" kern="1200" smtClean="0">
+                          <a:solidFill>
+                            <a:schemeClr val="tx1">
+                              <a:lumMod val="50000"/>
+                              <a:lumOff val="50000"/>
+                            </a:schemeClr>
+                          </a:solidFill>
+                          <a:latin typeface="+mn-lt"/>
+                          <a:ea typeface="+mn-ea"/>
+                          <a:cs typeface="+mn-cs"/>
+                        </a:rPr>
+                        <a:t>MVC5 </a:t>
+                      </a:r>
+                      <a:r>
+                        <a:rPr lang="es-ES_tradnl" sz="1500" kern="1200" smtClean="0">
+                          <a:solidFill>
+                            <a:schemeClr val="tx1">
+                              <a:lumMod val="50000"/>
+                              <a:lumOff val="50000"/>
+                            </a:schemeClr>
+                          </a:solidFill>
+                          <a:latin typeface="+mn-lt"/>
+                          <a:ea typeface="+mn-ea"/>
+                          <a:cs typeface="+mn-cs"/>
+                        </a:rPr>
+                        <a:t>- </a:t>
+                      </a:r>
+                      <a:r>
+                        <a:rPr lang="es-ES_tradnl" sz="1500" kern="1200" smtClean="0">
+                          <a:solidFill>
+                            <a:schemeClr val="tx1">
+                              <a:lumMod val="50000"/>
+                              <a:lumOff val="50000"/>
+                            </a:schemeClr>
+                          </a:solidFill>
+                          <a:latin typeface="+mn-lt"/>
+                          <a:ea typeface="+mn-ea"/>
+                          <a:cs typeface="+mn-cs"/>
+                        </a:rPr>
+                        <a:t>2/4</a:t>
                       </a:r>
                       <a:endParaRPr lang="en-US" sz="1500" kern="1200" dirty="0">
                         <a:solidFill>
@@ -9885,7 +9996,7 @@
                     <a:p>
                       <a:pPr algn="ctr"/>
                       <a:r>
-                        <a:rPr lang="es-ES_tradnl" sz="1500" b="1" dirty="0" smtClean="0">
+                        <a:rPr lang="es-ES_tradnl" sz="1500" b="1" smtClean="0">
                           <a:solidFill>
                             <a:schemeClr val="tx1">
                               <a:lumMod val="50000"/>
@@ -9893,10 +10004,10 @@
                             </a:schemeClr>
                           </a:solidFill>
                         </a:rPr>
-                        <a:t>Martes 29</a:t>
+                        <a:t>Martes </a:t>
                       </a:r>
                       <a:r>
-                        <a:rPr lang="es-ES_tradnl" sz="1500" b="1" baseline="0" dirty="0" smtClean="0">
+                        <a:rPr lang="es-ES_tradnl" sz="1500" b="1" smtClean="0">
                           <a:solidFill>
                             <a:schemeClr val="tx1">
                               <a:lumMod val="50000"/>
@@ -9904,7 +10015,18 @@
                             </a:schemeClr>
                           </a:solidFill>
                         </a:rPr>
-                        <a:t>/09</a:t>
+                        <a:t>11</a:t>
+                      </a:r>
+                      <a:r>
+                        <a:rPr lang="es-ES_tradnl" sz="1500" b="1" baseline="0" smtClean="0">
+                          <a:solidFill>
+                            <a:schemeClr val="tx1">
+                              <a:lumMod val="50000"/>
+                              <a:lumOff val="50000"/>
+                            </a:schemeClr>
+                          </a:solidFill>
+                        </a:rPr>
+                        <a:t>/04</a:t>
                       </a:r>
                       <a:endParaRPr lang="en-US" sz="1500" b="1" dirty="0">
                         <a:solidFill>
@@ -9957,10 +10079,10 @@
                           <a:ea typeface="+mn-ea"/>
                           <a:cs typeface="+mn-cs"/>
                         </a:rPr>
-                        <a:t> Aplicaciones web con </a:t>
+                        <a:t> Aplicaciones web </a:t>
                       </a:r>
                       <a:r>
-                        <a:rPr lang="es-ES_tradnl" sz="1500" kern="1200" dirty="0" smtClean="0">
+                        <a:rPr lang="es-ES_tradnl" sz="1500" kern="1200" baseline="0" smtClean="0">
                           <a:solidFill>
                             <a:schemeClr val="tx1">
                               <a:lumMod val="50000"/>
@@ -9971,7 +10093,49 @@
                           <a:ea typeface="+mn-ea"/>
                           <a:cs typeface="+mn-cs"/>
                         </a:rPr>
-                        <a:t>MVC4 - 4/5</a:t>
+                        <a:t>con </a:t>
+                      </a:r>
+                      <a:r>
+                        <a:rPr lang="es-ES_tradnl" sz="1500" kern="1200" smtClean="0">
+                          <a:solidFill>
+                            <a:schemeClr val="tx1">
+                              <a:lumMod val="50000"/>
+                              <a:lumOff val="50000"/>
+                            </a:schemeClr>
+                          </a:solidFill>
+                          <a:latin typeface="+mn-lt"/>
+                          <a:ea typeface="+mn-ea"/>
+                          <a:cs typeface="+mn-cs"/>
+                        </a:rPr>
+                        <a:t>MVC5 </a:t>
+                      </a:r>
+                      <a:r>
+                        <a:rPr lang="es-ES_tradnl" sz="1500" kern="1200" smtClean="0">
+                          <a:solidFill>
+                            <a:schemeClr val="tx1">
+                              <a:lumMod val="50000"/>
+                              <a:lumOff val="50000"/>
+                            </a:schemeClr>
+                          </a:solidFill>
+                          <a:latin typeface="+mn-lt"/>
+                          <a:ea typeface="+mn-ea"/>
+                          <a:cs typeface="+mn-cs"/>
+                        </a:rPr>
+                        <a:t>- </a:t>
+                      </a:r>
+                      <a:r>
+                        <a:rPr lang="es-ES_tradnl" sz="1500" kern="1200" smtClean="0">
+                          <a:solidFill>
+                            <a:schemeClr val="tx1">
+                              <a:lumMod val="50000"/>
+                              <a:lumOff val="50000"/>
+                            </a:schemeClr>
+                          </a:solidFill>
+                          <a:latin typeface="+mn-lt"/>
+                          <a:ea typeface="+mn-ea"/>
+                          <a:cs typeface="+mn-cs"/>
+                        </a:rPr>
+                        <a:t>3/4</a:t>
                       </a:r>
                       <a:endParaRPr lang="en-US" sz="1500" kern="1200" dirty="0">
                         <a:solidFill>
@@ -10039,7 +10203,7 @@
                     <a:p>
                       <a:pPr algn="ctr"/>
                       <a:r>
-                        <a:rPr lang="es-ES_tradnl" sz="1500" b="1" dirty="0" smtClean="0">
+                        <a:rPr lang="es-ES_tradnl" sz="1500" b="1" smtClean="0">
                           <a:solidFill>
                             <a:schemeClr val="tx1">
                               <a:lumMod val="50000"/>
@@ -10047,10 +10211,10 @@
                             </a:schemeClr>
                           </a:solidFill>
                         </a:rPr>
-                        <a:t>Jueves 01</a:t>
+                        <a:t>Jueves </a:t>
                       </a:r>
                       <a:r>
-                        <a:rPr lang="es-ES_tradnl" sz="1500" b="1" baseline="0" dirty="0" smtClean="0">
+                        <a:rPr lang="es-ES_tradnl" sz="1500" b="1" smtClean="0">
                           <a:solidFill>
                             <a:schemeClr val="tx1">
                               <a:lumMod val="50000"/>
@@ -10058,7 +10222,18 @@
                             </a:schemeClr>
                           </a:solidFill>
                         </a:rPr>
-                        <a:t>/10</a:t>
+                        <a:t>14</a:t>
+                      </a:r>
+                      <a:r>
+                        <a:rPr lang="es-ES_tradnl" sz="1500" b="1" baseline="0" smtClean="0">
+                          <a:solidFill>
+                            <a:schemeClr val="tx1">
+                              <a:lumMod val="50000"/>
+                              <a:lumOff val="50000"/>
+                            </a:schemeClr>
+                          </a:solidFill>
+                        </a:rPr>
+                        <a:t>/04</a:t>
                       </a:r>
                       <a:endParaRPr lang="en-US" sz="1500" b="1" dirty="0">
                         <a:solidFill>
@@ -10082,7 +10257,7 @@
                         <a:buNone/>
                       </a:pPr>
                       <a:r>
-                        <a:rPr lang="es-ES_tradnl" sz="1500" kern="1200" dirty="0" smtClean="0">
+                        <a:rPr lang="es-ES_tradnl" sz="1500" kern="1200" smtClean="0">
                           <a:solidFill>
                             <a:schemeClr val="tx1">
                               <a:lumMod val="50000"/>
@@ -10096,7 +10271,7 @@
                         <a:t>Práctica</a:t>
                       </a:r>
                       <a:r>
-                        <a:rPr lang="es-ES_tradnl" sz="1500" kern="1200" baseline="0" dirty="0" smtClean="0">
+                        <a:rPr lang="es-ES_tradnl" sz="1500" kern="1200" baseline="0" smtClean="0">
                           <a:solidFill>
                             <a:schemeClr val="tx1">
                               <a:lumMod val="50000"/>
@@ -10107,10 +10282,10 @@
                           <a:ea typeface="+mn-ea"/>
                           <a:cs typeface="+mn-cs"/>
                         </a:rPr>
-                        <a:t> Aplicaciones web con </a:t>
+                        <a:t> </a:t>
                       </a:r>
                       <a:r>
-                        <a:rPr lang="es-ES_tradnl" sz="1500" kern="1200" dirty="0" smtClean="0">
+                        <a:rPr lang="es-ES_tradnl" sz="1500" kern="1200" baseline="0" smtClean="0">
                           <a:solidFill>
                             <a:schemeClr val="tx1">
                               <a:lumMod val="50000"/>
@@ -10121,7 +10296,77 @@
                           <a:ea typeface="+mn-ea"/>
                           <a:cs typeface="+mn-cs"/>
                         </a:rPr>
-                        <a:t>MVC4 – 5/5</a:t>
+                        <a:t>de integraci</a:t>
+                      </a:r>
+                      <a:r>
+                        <a:rPr lang="en-US" sz="1500" kern="1200" baseline="0" smtClean="0">
+                          <a:solidFill>
+                            <a:schemeClr val="tx1">
+                              <a:lumMod val="50000"/>
+                              <a:lumOff val="50000"/>
+                            </a:schemeClr>
+                          </a:solidFill>
+                          <a:latin typeface="+mn-lt"/>
+                          <a:ea typeface="+mn-ea"/>
+                          <a:cs typeface="+mn-cs"/>
+                        </a:rPr>
+                        <a:t>ó</a:t>
+                      </a:r>
+                      <a:r>
+                        <a:rPr lang="es-ES_tradnl" sz="1500" kern="1200" baseline="0" smtClean="0">
+                          <a:solidFill>
+                            <a:schemeClr val="tx1">
+                              <a:lumMod val="50000"/>
+                              <a:lumOff val="50000"/>
+                            </a:schemeClr>
+                          </a:solidFill>
+                          <a:latin typeface="+mn-lt"/>
+                          <a:ea typeface="+mn-ea"/>
+                          <a:cs typeface="+mn-cs"/>
+                        </a:rPr>
+                        <a:t>n</a:t>
+                      </a:r>
+                      <a:r>
+                        <a:rPr lang="es-ES_tradnl" sz="1500" kern="1200" smtClean="0">
+                          <a:solidFill>
+                            <a:schemeClr val="tx1">
+                              <a:lumMod val="50000"/>
+                              <a:lumOff val="50000"/>
+                            </a:schemeClr>
+                          </a:solidFill>
+                          <a:latin typeface="+mn-lt"/>
+                          <a:ea typeface="+mn-ea"/>
+                          <a:cs typeface="+mn-cs"/>
+                        </a:rPr>
+                        <a:t> </a:t>
+                      </a:r>
+                      <a:r>
+                        <a:rPr lang="es-ES_tradnl" sz="1500" kern="1200" smtClean="0">
+                          <a:solidFill>
+                            <a:schemeClr val="tx1">
+                              <a:lumMod val="50000"/>
+                              <a:lumOff val="50000"/>
+                            </a:schemeClr>
+                          </a:solidFill>
+                          <a:latin typeface="+mn-lt"/>
+                          <a:ea typeface="+mn-ea"/>
+                          <a:cs typeface="+mn-cs"/>
+                        </a:rPr>
+                        <a:t>– </a:t>
+                      </a:r>
+                      <a:r>
+                        <a:rPr lang="es-ES_tradnl" sz="1500" kern="1200" smtClean="0">
+                          <a:solidFill>
+                            <a:schemeClr val="tx1">
+                              <a:lumMod val="50000"/>
+                              <a:lumOff val="50000"/>
+                            </a:schemeClr>
+                          </a:solidFill>
+                          <a:latin typeface="+mn-lt"/>
+                          <a:ea typeface="+mn-ea"/>
+                          <a:cs typeface="+mn-cs"/>
+                        </a:rPr>
+                        <a:t>4/4</a:t>
                       </a:r>
                       <a:endParaRPr lang="en-US" sz="1500" kern="1200" dirty="0" smtClean="0">
                         <a:solidFill>

</xml_diff>

<commit_message>
-Modificaciones en introduccion cleancode y POO en formato de diseño para unificarlos y revision ortografica - Se actualiza la Agenta en el archivo de presentacion a hx con el cronograma de actividades 2017
</commit_message>
<xml_diff>
--- a/Presentaciones/1 - Presentacion Hexacta.pptx
+++ b/Presentaciones/1 - Presentacion Hexacta.pptx
@@ -279,7 +279,7 @@
               <a:pPr>
                 <a:defRPr/>
               </a:pPr>
-              <a:t>22-Mar-16</a:t>
+              <a:t>4/21/2017</a:t>
             </a:fld>
             <a:endParaRPr lang="en-US"/>
           </a:p>
@@ -474,7 +474,7 @@
               <a:pPr>
                 <a:defRPr/>
               </a:pPr>
-              <a:t>22-Mar-16</a:t>
+              <a:t>4/21/2017</a:t>
             </a:fld>
             <a:endParaRPr lang="en-US"/>
           </a:p>
@@ -9103,7 +9103,7 @@
           <p:nvPr>
             <p:extLst>
               <p:ext uri="{D42A27DB-BD31-4B8C-83A1-F6EECF244321}">
-                <p14:modId xmlns:p14="http://schemas.microsoft.com/office/powerpoint/2010/main" val="1680377156"/>
+                <p14:modId xmlns:p14="http://schemas.microsoft.com/office/powerpoint/2010/main" val="1545635805"/>
               </p:ext>
             </p:extLst>
           </p:nvPr>
@@ -9273,7 +9273,7 @@
                     <a:p>
                       <a:pPr algn="ctr"/>
                       <a:r>
-                        <a:rPr lang="es-ES_tradnl" sz="1500" b="1" smtClean="0">
+                        <a:rPr lang="es-ES_tradnl" sz="1500" b="1" dirty="0" smtClean="0">
                           <a:solidFill>
                             <a:schemeClr val="tx1">
                               <a:lumMod val="50000"/>
@@ -9284,7 +9284,7 @@
                         <a:t>Martes </a:t>
                       </a:r>
                       <a:r>
-                        <a:rPr lang="es-ES_tradnl" sz="1500" b="1" smtClean="0">
+                        <a:rPr lang="es-ES_tradnl" sz="1500" b="1" dirty="0" smtClean="0">
                           <a:solidFill>
                             <a:schemeClr val="tx1">
                               <a:lumMod val="50000"/>
@@ -9292,18 +9292,7 @@
                             </a:schemeClr>
                           </a:solidFill>
                         </a:rPr>
-                        <a:t>29</a:t>
-                      </a:r>
-                      <a:r>
-                        <a:rPr lang="es-ES_tradnl" sz="1500" b="1" baseline="0" smtClean="0">
-                          <a:solidFill>
-                            <a:schemeClr val="tx1">
-                              <a:lumMod val="50000"/>
-                              <a:lumOff val="50000"/>
-                            </a:schemeClr>
-                          </a:solidFill>
-                        </a:rPr>
-                        <a:t>/03</a:t>
+                        <a:t>25/04</a:t>
                       </a:r>
                       <a:endParaRPr lang="en-US" sz="1500" b="1" dirty="0">
                         <a:solidFill>
@@ -9330,6 +9319,20 @@
                     <a:lstStyle/>
                     <a:p>
                       <a:pPr algn="l"/>
+                      <a:r>
+                        <a:rPr lang="es-ES_tradnl" sz="1500" kern="1200" dirty="0" smtClean="0">
+                          <a:solidFill>
+                            <a:schemeClr val="tx1">
+                              <a:lumMod val="50000"/>
+                              <a:lumOff val="50000"/>
+                            </a:schemeClr>
+                          </a:solidFill>
+                          <a:latin typeface="+mn-lt"/>
+                          <a:ea typeface="+mn-ea"/>
+                          <a:cs typeface="+mn-cs"/>
+                        </a:rPr>
+                        <a:t>.NET, </a:t>
+                      </a:r>
                       <a:r>
                         <a:rPr lang="es-ES_tradnl" sz="1500" dirty="0" err="1" smtClean="0">
                           <a:solidFill>
@@ -9372,38 +9375,8 @@
                             </a:schemeClr>
                           </a:solidFill>
                         </a:rPr>
-                        <a:t> </a:t>
+                        <a:t> + POO</a:t>
                       </a:r>
-                      <a:r>
-                        <a:rPr lang="es-ES_tradnl" sz="1500" smtClean="0">
-                          <a:solidFill>
-                            <a:schemeClr val="tx1">
-                              <a:lumMod val="50000"/>
-                              <a:lumOff val="50000"/>
-                            </a:schemeClr>
-                          </a:solidFill>
-                        </a:rPr>
-                        <a:t>+ </a:t>
-                      </a:r>
-                      <a:r>
-                        <a:rPr lang="es-ES_tradnl" sz="1500" smtClean="0">
-                          <a:solidFill>
-                            <a:schemeClr val="tx1">
-                              <a:lumMod val="50000"/>
-                              <a:lumOff val="50000"/>
-                            </a:schemeClr>
-                          </a:solidFill>
-                        </a:rPr>
-                        <a:t>POO</a:t>
-                      </a:r>
-                      <a:endParaRPr lang="es-ES_tradnl" sz="1500" dirty="0" smtClean="0">
-                        <a:solidFill>
-                          <a:schemeClr val="tx1">
-                            <a:lumMod val="50000"/>
-                            <a:lumOff val="50000"/>
-                          </a:schemeClr>
-                        </a:solidFill>
-                      </a:endParaRPr>
                     </a:p>
                   </a:txBody>
                   <a:tcPr anchor="ctr">
@@ -9459,7 +9432,7 @@
                     <a:p>
                       <a:pPr algn="ctr"/>
                       <a:r>
-                        <a:rPr lang="es-ES_tradnl" sz="1500" b="1" smtClean="0">
+                        <a:rPr lang="es-ES_tradnl" sz="1500" b="1" dirty="0" smtClean="0">
                           <a:solidFill>
                             <a:schemeClr val="tx1">
                               <a:lumMod val="50000"/>
@@ -9470,7 +9443,7 @@
                         <a:t>Jueves </a:t>
                       </a:r>
                       <a:r>
-                        <a:rPr lang="es-ES_tradnl" sz="1500" b="1" smtClean="0">
+                        <a:rPr lang="es-ES_tradnl" sz="1500" b="1" dirty="0" smtClean="0">
                           <a:solidFill>
                             <a:schemeClr val="tx1">
                               <a:lumMod val="50000"/>
@@ -9478,18 +9451,7 @@
                             </a:schemeClr>
                           </a:solidFill>
                         </a:rPr>
-                        <a:t>31</a:t>
-                      </a:r>
-                      <a:r>
-                        <a:rPr lang="es-ES_tradnl" sz="1500" b="1" baseline="0" smtClean="0">
-                          <a:solidFill>
-                            <a:schemeClr val="tx1">
-                              <a:lumMod val="50000"/>
-                              <a:lumOff val="50000"/>
-                            </a:schemeClr>
-                          </a:solidFill>
-                        </a:rPr>
-                        <a:t>/03</a:t>
+                        <a:t>27/04</a:t>
                       </a:r>
                       <a:endParaRPr lang="en-US" sz="1500" b="1" dirty="0">
                         <a:solidFill>
@@ -9508,25 +9470,9 @@
                     <a:bodyPr/>
                     <a:lstStyle/>
                     <a:p>
-                      <a:pPr marL="0" marR="0" indent="0" algn="l" defTabSz="914400" rtl="0" eaLnBrk="1" fontAlgn="auto" latinLnBrk="0" hangingPunct="1">
-                        <a:lnSpc>
-                          <a:spcPct val="100000"/>
-                        </a:lnSpc>
-                        <a:spcBef>
-                          <a:spcPts val="0"/>
-                        </a:spcBef>
-                        <a:spcAft>
-                          <a:spcPts val="0"/>
-                        </a:spcAft>
-                        <a:buClrTx/>
-                        <a:buSzTx/>
-                        <a:buFontTx/>
-                        <a:buNone/>
-                        <a:tabLst/>
-                        <a:defRPr/>
-                      </a:pPr>
+                      <a:pPr marL="0" algn="l" defTabSz="914400" rtl="0" eaLnBrk="1" latinLnBrk="0" hangingPunct="1"/>
                       <a:r>
-                        <a:rPr lang="es-ES_tradnl" sz="1500" kern="1200" smtClean="0">
+                        <a:rPr lang="es-ES_tradnl" sz="1500" kern="1200" dirty="0" smtClean="0">
                           <a:solidFill>
                             <a:schemeClr val="tx1">
                               <a:lumMod val="50000"/>
@@ -9537,15 +9483,46 @@
                           <a:ea typeface="+mn-ea"/>
                           <a:cs typeface="+mn-cs"/>
                         </a:rPr>
-                        <a:t>.NET, C#</a:t>
+                        <a:t>Práctica</a:t>
                       </a:r>
-                      <a:endParaRPr lang="es-ES_tradnl" sz="1500" dirty="0" smtClean="0">
+                      <a:r>
+                        <a:rPr lang="es-ES_tradnl" sz="1500" kern="1200" baseline="0" dirty="0" smtClean="0">
+                          <a:solidFill>
+                            <a:schemeClr val="tx1">
+                              <a:lumMod val="50000"/>
+                              <a:lumOff val="50000"/>
+                            </a:schemeClr>
+                          </a:solidFill>
+                          <a:latin typeface="+mn-lt"/>
+                          <a:ea typeface="+mn-ea"/>
+                          <a:cs typeface="+mn-cs"/>
+                        </a:rPr>
+                        <a:t> Aplicaciones web con </a:t>
+                      </a:r>
+                      <a:r>
+                        <a:rPr lang="es-ES_tradnl" sz="1500" kern="1200" dirty="0" smtClean="0">
+                          <a:solidFill>
+                            <a:schemeClr val="tx1">
+                              <a:lumMod val="50000"/>
+                              <a:lumOff val="50000"/>
+                            </a:schemeClr>
+                          </a:solidFill>
+                          <a:latin typeface="+mn-lt"/>
+                          <a:ea typeface="+mn-ea"/>
+                          <a:cs typeface="+mn-cs"/>
+                        </a:rPr>
+                        <a:t>MVC5 - 1/4</a:t>
+                      </a:r>
+                      <a:endParaRPr lang="en-US" sz="1500" kern="1200" dirty="0">
                         <a:solidFill>
                           <a:schemeClr val="tx1">
                             <a:lumMod val="50000"/>
                             <a:lumOff val="50000"/>
                           </a:schemeClr>
                         </a:solidFill>
+                        <a:latin typeface="+mn-lt"/>
+                        <a:ea typeface="+mn-ea"/>
+                        <a:cs typeface="+mn-cs"/>
                       </a:endParaRPr>
                     </a:p>
                   </a:txBody>
@@ -9595,7 +9572,7 @@
                     <a:p>
                       <a:pPr marL="0" algn="ctr" defTabSz="914400" rtl="0" eaLnBrk="1" latinLnBrk="0" hangingPunct="1"/>
                       <a:r>
-                        <a:rPr lang="es-ES_tradnl" sz="1500" b="1" kern="1200" smtClean="0">
+                        <a:rPr lang="es-ES_tradnl" sz="1500" b="1" kern="1200" dirty="0" smtClean="0">
                           <a:solidFill>
                             <a:schemeClr val="tx1">
                               <a:lumMod val="50000"/>
@@ -9609,7 +9586,7 @@
                         <a:t>Martes</a:t>
                       </a:r>
                       <a:r>
-                        <a:rPr lang="es-ES_tradnl" sz="1500" b="1" kern="1200" baseline="0" smtClean="0">
+                        <a:rPr lang="es-ES_tradnl" sz="1500" b="1" kern="1200" baseline="0" dirty="0" smtClean="0">
                           <a:solidFill>
                             <a:schemeClr val="tx1">
                               <a:lumMod val="50000"/>
@@ -9623,7 +9600,7 @@
                         <a:t> </a:t>
                       </a:r>
                       <a:r>
-                        <a:rPr lang="es-ES_tradnl" sz="1500" b="1" kern="1200" baseline="0" smtClean="0">
+                        <a:rPr lang="es-ES_tradnl" sz="1500" b="1" kern="1200" baseline="0" dirty="0" smtClean="0">
                           <a:solidFill>
                             <a:schemeClr val="tx1">
                               <a:lumMod val="50000"/>
@@ -9634,7 +9611,7 @@
                           <a:ea typeface="+mn-ea"/>
                           <a:cs typeface="+mn-cs"/>
                         </a:rPr>
-                        <a:t>4/04</a:t>
+                        <a:t>02/05</a:t>
                       </a:r>
                       <a:endParaRPr lang="en-US" sz="1500" b="1" kern="1200" dirty="0">
                         <a:solidFill>
@@ -9690,10 +9667,10 @@
                           <a:ea typeface="+mn-ea"/>
                           <a:cs typeface="+mn-cs"/>
                         </a:rPr>
-                        <a:t> Aplicaciones web </a:t>
+                        <a:t> Aplicaciones web con </a:t>
                       </a:r>
                       <a:r>
-                        <a:rPr lang="es-ES_tradnl" sz="1500" kern="1200" baseline="0" smtClean="0">
+                        <a:rPr lang="es-ES_tradnl" sz="1500" kern="1200" dirty="0" smtClean="0">
                           <a:solidFill>
                             <a:schemeClr val="tx1">
                               <a:lumMod val="50000"/>
@@ -9704,49 +9681,7 @@
                           <a:ea typeface="+mn-ea"/>
                           <a:cs typeface="+mn-cs"/>
                         </a:rPr>
-                        <a:t>con </a:t>
-                      </a:r>
-                      <a:r>
-                        <a:rPr lang="es-ES_tradnl" sz="1500" kern="1200" smtClean="0">
-                          <a:solidFill>
-                            <a:schemeClr val="tx1">
-                              <a:lumMod val="50000"/>
-                              <a:lumOff val="50000"/>
-                            </a:schemeClr>
-                          </a:solidFill>
-                          <a:latin typeface="+mn-lt"/>
-                          <a:ea typeface="+mn-ea"/>
-                          <a:cs typeface="+mn-cs"/>
-                        </a:rPr>
-                        <a:t>MVC5 </a:t>
-                      </a:r>
-                      <a:r>
-                        <a:rPr lang="es-ES_tradnl" sz="1500" kern="1200" smtClean="0">
-                          <a:solidFill>
-                            <a:schemeClr val="tx1">
-                              <a:lumMod val="50000"/>
-                              <a:lumOff val="50000"/>
-                            </a:schemeClr>
-                          </a:solidFill>
-                          <a:latin typeface="+mn-lt"/>
-                          <a:ea typeface="+mn-ea"/>
-                          <a:cs typeface="+mn-cs"/>
-                        </a:rPr>
-                        <a:t>- </a:t>
-                      </a:r>
-                      <a:r>
-                        <a:rPr lang="es-ES_tradnl" sz="1500" kern="1200" smtClean="0">
-                          <a:solidFill>
-                            <a:schemeClr val="tx1">
-                              <a:lumMod val="50000"/>
-                              <a:lumOff val="50000"/>
-                            </a:schemeClr>
-                          </a:solidFill>
-                          <a:latin typeface="+mn-lt"/>
-                          <a:ea typeface="+mn-ea"/>
-                          <a:cs typeface="+mn-cs"/>
-                        </a:rPr>
-                        <a:t>1/4</a:t>
+                        <a:t>MVC5 - 2/4</a:t>
                       </a:r>
                       <a:endParaRPr lang="en-US" sz="1500" kern="1200" dirty="0">
                         <a:solidFill>
@@ -9814,7 +9749,7 @@
                     <a:p>
                       <a:pPr algn="ctr"/>
                       <a:r>
-                        <a:rPr lang="es-ES_tradnl" sz="1500" b="1" smtClean="0">
+                        <a:rPr lang="es-ES_tradnl" sz="1500" b="1" dirty="0" smtClean="0">
                           <a:solidFill>
                             <a:schemeClr val="tx1">
                               <a:lumMod val="50000"/>
@@ -9825,7 +9760,7 @@
                         <a:t>Jueves </a:t>
                       </a:r>
                       <a:r>
-                        <a:rPr lang="es-ES_tradnl" sz="1500" b="1" smtClean="0">
+                        <a:rPr lang="es-ES_tradnl" sz="1500" b="1" dirty="0" smtClean="0">
                           <a:solidFill>
                             <a:schemeClr val="tx1">
                               <a:lumMod val="50000"/>
@@ -9833,7 +9768,7 @@
                             </a:schemeClr>
                           </a:solidFill>
                         </a:rPr>
-                        <a:t>7/04</a:t>
+                        <a:t>04/05</a:t>
                       </a:r>
                       <a:endParaRPr lang="en-US" sz="1500" b="1" dirty="0">
                         <a:solidFill>
@@ -9879,10 +9814,10 @@
                           <a:ea typeface="+mn-ea"/>
                           <a:cs typeface="+mn-cs"/>
                         </a:rPr>
-                        <a:t> Aplicaciones web </a:t>
+                        <a:t> Aplicaciones web con </a:t>
                       </a:r>
                       <a:r>
-                        <a:rPr lang="es-ES_tradnl" sz="1500" kern="1200" baseline="0" smtClean="0">
+                        <a:rPr lang="es-ES_tradnl" sz="1500" kern="1200" dirty="0" smtClean="0">
                           <a:solidFill>
                             <a:schemeClr val="tx1">
                               <a:lumMod val="50000"/>
@@ -9893,49 +9828,7 @@
                           <a:ea typeface="+mn-ea"/>
                           <a:cs typeface="+mn-cs"/>
                         </a:rPr>
-                        <a:t>con </a:t>
-                      </a:r>
-                      <a:r>
-                        <a:rPr lang="es-ES_tradnl" sz="1500" kern="1200" smtClean="0">
-                          <a:solidFill>
-                            <a:schemeClr val="tx1">
-                              <a:lumMod val="50000"/>
-                              <a:lumOff val="50000"/>
-                            </a:schemeClr>
-                          </a:solidFill>
-                          <a:latin typeface="+mn-lt"/>
-                          <a:ea typeface="+mn-ea"/>
-                          <a:cs typeface="+mn-cs"/>
-                        </a:rPr>
-                        <a:t>MVC5 </a:t>
-                      </a:r>
-                      <a:r>
-                        <a:rPr lang="es-ES_tradnl" sz="1500" kern="1200" smtClean="0">
-                          <a:solidFill>
-                            <a:schemeClr val="tx1">
-                              <a:lumMod val="50000"/>
-                              <a:lumOff val="50000"/>
-                            </a:schemeClr>
-                          </a:solidFill>
-                          <a:latin typeface="+mn-lt"/>
-                          <a:ea typeface="+mn-ea"/>
-                          <a:cs typeface="+mn-cs"/>
-                        </a:rPr>
-                        <a:t>- </a:t>
-                      </a:r>
-                      <a:r>
-                        <a:rPr lang="es-ES_tradnl" sz="1500" kern="1200" smtClean="0">
-                          <a:solidFill>
-                            <a:schemeClr val="tx1">
-                              <a:lumMod val="50000"/>
-                              <a:lumOff val="50000"/>
-                            </a:schemeClr>
-                          </a:solidFill>
-                          <a:latin typeface="+mn-lt"/>
-                          <a:ea typeface="+mn-ea"/>
-                          <a:cs typeface="+mn-cs"/>
-                        </a:rPr>
-                        <a:t>2/4</a:t>
+                        <a:t>MVC5 - 3/4</a:t>
                       </a:r>
                       <a:endParaRPr lang="en-US" sz="1500" kern="1200" dirty="0">
                         <a:solidFill>
@@ -9996,7 +9889,7 @@
                     <a:p>
                       <a:pPr algn="ctr"/>
                       <a:r>
-                        <a:rPr lang="es-ES_tradnl" sz="1500" b="1" smtClean="0">
+                        <a:rPr lang="es-ES_tradnl" sz="1500" b="1" dirty="0" smtClean="0">
                           <a:solidFill>
                             <a:schemeClr val="tx1">
                               <a:lumMod val="50000"/>
@@ -10007,7 +9900,7 @@
                         <a:t>Martes </a:t>
                       </a:r>
                       <a:r>
-                        <a:rPr lang="es-ES_tradnl" sz="1500" b="1" smtClean="0">
+                        <a:rPr lang="es-ES_tradnl" sz="1500" b="1" dirty="0" smtClean="0">
                           <a:solidFill>
                             <a:schemeClr val="tx1">
                               <a:lumMod val="50000"/>
@@ -10015,10 +9908,10 @@
                             </a:schemeClr>
                           </a:solidFill>
                         </a:rPr>
-                        <a:t>11</a:t>
+                        <a:t>09</a:t>
                       </a:r>
                       <a:r>
-                        <a:rPr lang="es-ES_tradnl" sz="1500" b="1" baseline="0" smtClean="0">
+                        <a:rPr lang="es-ES_tradnl" sz="1500" b="1" baseline="0" dirty="0" smtClean="0">
                           <a:solidFill>
                             <a:schemeClr val="tx1">
                               <a:lumMod val="50000"/>
@@ -10026,7 +9919,7 @@
                             </a:schemeClr>
                           </a:solidFill>
                         </a:rPr>
-                        <a:t>/04</a:t>
+                        <a:t>/05</a:t>
                       </a:r>
                       <a:endParaRPr lang="en-US" sz="1500" b="1" dirty="0">
                         <a:solidFill>
@@ -10052,98 +9945,56 @@
                     <a:bodyPr/>
                     <a:lstStyle/>
                     <a:p>
-                      <a:pPr marL="0" algn="l" defTabSz="914400" rtl="0" eaLnBrk="1" latinLnBrk="0" hangingPunct="1"/>
+                      <a:pPr marL="0" marR="0" lvl="0" indent="0" algn="l" defTabSz="914400" rtl="0" eaLnBrk="1" fontAlgn="auto" latinLnBrk="0" hangingPunct="1">
+                        <a:lnSpc>
+                          <a:spcPct val="100000"/>
+                        </a:lnSpc>
+                        <a:spcBef>
+                          <a:spcPts val="0"/>
+                        </a:spcBef>
+                        <a:spcAft>
+                          <a:spcPts val="0"/>
+                        </a:spcAft>
+                        <a:buClrTx/>
+                        <a:buSzTx/>
+                        <a:buFontTx/>
+                        <a:buNone/>
+                        <a:tabLst/>
+                        <a:defRPr/>
+                      </a:pPr>
                       <a:r>
-                        <a:rPr lang="es-ES_tradnl" sz="1500" kern="1200" dirty="0" smtClean="0">
+                        <a:rPr kumimoji="0" lang="es-ES_tradnl" sz="1500" b="0" i="0" u="none" strike="noStrike" kern="1200" cap="none" spc="0" normalizeH="0" baseline="0" noProof="0" dirty="0" smtClean="0">
+                          <a:ln>
+                            <a:noFill/>
+                          </a:ln>
                           <a:solidFill>
-                            <a:schemeClr val="tx1">
+                            <a:srgbClr val="4D4D4D">
                               <a:lumMod val="50000"/>
                               <a:lumOff val="50000"/>
-                            </a:schemeClr>
+                            </a:srgbClr>
                           </a:solidFill>
+                          <a:effectLst/>
+                          <a:uLnTx/>
+                          <a:uFillTx/>
                           <a:latin typeface="+mn-lt"/>
                           <a:ea typeface="+mn-ea"/>
                           <a:cs typeface="+mn-cs"/>
                         </a:rPr>
-                        <a:t>Práctica</a:t>
+                        <a:t>Práctica Aplicaciones web con MVC5 - 4/4</a:t>
                       </a:r>
-                      <a:r>
-                        <a:rPr lang="es-ES_tradnl" sz="1500" kern="1200" baseline="0" dirty="0" smtClean="0">
-                          <a:solidFill>
-                            <a:schemeClr val="tx1">
-                              <a:lumMod val="50000"/>
-                              <a:lumOff val="50000"/>
-                            </a:schemeClr>
-                          </a:solidFill>
-                          <a:latin typeface="+mn-lt"/>
-                          <a:ea typeface="+mn-ea"/>
-                          <a:cs typeface="+mn-cs"/>
-                        </a:rPr>
-                        <a:t> Aplicaciones web </a:t>
-                      </a:r>
-                      <a:r>
-                        <a:rPr lang="es-ES_tradnl" sz="1500" kern="1200" baseline="0" smtClean="0">
-                          <a:solidFill>
-                            <a:schemeClr val="tx1">
-                              <a:lumMod val="50000"/>
-                              <a:lumOff val="50000"/>
-                            </a:schemeClr>
-                          </a:solidFill>
-                          <a:latin typeface="+mn-lt"/>
-                          <a:ea typeface="+mn-ea"/>
-                          <a:cs typeface="+mn-cs"/>
-                        </a:rPr>
-                        <a:t>con </a:t>
-                      </a:r>
-                      <a:r>
-                        <a:rPr lang="es-ES_tradnl" sz="1500" kern="1200" smtClean="0">
-                          <a:solidFill>
-                            <a:schemeClr val="tx1">
-                              <a:lumMod val="50000"/>
-                              <a:lumOff val="50000"/>
-                            </a:schemeClr>
-                          </a:solidFill>
-                          <a:latin typeface="+mn-lt"/>
-                          <a:ea typeface="+mn-ea"/>
-                          <a:cs typeface="+mn-cs"/>
-                        </a:rPr>
-                        <a:t>MVC5 </a:t>
-                      </a:r>
-                      <a:r>
-                        <a:rPr lang="es-ES_tradnl" sz="1500" kern="1200" smtClean="0">
-                          <a:solidFill>
-                            <a:schemeClr val="tx1">
-                              <a:lumMod val="50000"/>
-                              <a:lumOff val="50000"/>
-                            </a:schemeClr>
-                          </a:solidFill>
-                          <a:latin typeface="+mn-lt"/>
-                          <a:ea typeface="+mn-ea"/>
-                          <a:cs typeface="+mn-cs"/>
-                        </a:rPr>
-                        <a:t>- </a:t>
-                      </a:r>
-                      <a:r>
-                        <a:rPr lang="es-ES_tradnl" sz="1500" kern="1200" smtClean="0">
-                          <a:solidFill>
-                            <a:schemeClr val="tx1">
-                              <a:lumMod val="50000"/>
-                              <a:lumOff val="50000"/>
-                            </a:schemeClr>
-                          </a:solidFill>
-                          <a:latin typeface="+mn-lt"/>
-                          <a:ea typeface="+mn-ea"/>
-                          <a:cs typeface="+mn-cs"/>
-                        </a:rPr>
-                        <a:t>3/4</a:t>
-                      </a:r>
-                      <a:endParaRPr lang="en-US" sz="1500" kern="1200" dirty="0">
+                      <a:endParaRPr kumimoji="0" lang="en-US" sz="1500" b="0" i="0" u="none" strike="noStrike" kern="1200" cap="none" spc="0" normalizeH="0" baseline="0" noProof="0" dirty="0" smtClean="0">
+                        <a:ln>
+                          <a:noFill/>
+                        </a:ln>
                         <a:solidFill>
-                          <a:schemeClr val="tx1">
+                          <a:srgbClr val="4D4D4D">
                             <a:lumMod val="50000"/>
                             <a:lumOff val="50000"/>
-                          </a:schemeClr>
+                          </a:srgbClr>
                         </a:solidFill>
+                        <a:effectLst/>
+                        <a:uLnTx/>
+                        <a:uFillTx/>
                         <a:latin typeface="+mn-lt"/>
                         <a:ea typeface="+mn-ea"/>
                         <a:cs typeface="+mn-cs"/>
@@ -10203,7 +10054,7 @@
                     <a:p>
                       <a:pPr algn="ctr"/>
                       <a:r>
-                        <a:rPr lang="es-ES_tradnl" sz="1500" b="1" smtClean="0">
+                        <a:rPr lang="es-ES_tradnl" sz="1500" b="1" dirty="0" smtClean="0">
                           <a:solidFill>
                             <a:schemeClr val="tx1">
                               <a:lumMod val="50000"/>
@@ -10214,7 +10065,7 @@
                         <a:t>Jueves </a:t>
                       </a:r>
                       <a:r>
-                        <a:rPr lang="es-ES_tradnl" sz="1500" b="1" smtClean="0">
+                        <a:rPr lang="es-ES_tradnl" sz="1500" b="1" dirty="0" smtClean="0">
                           <a:solidFill>
                             <a:schemeClr val="tx1">
                               <a:lumMod val="50000"/>
@@ -10222,10 +10073,10 @@
                             </a:schemeClr>
                           </a:solidFill>
                         </a:rPr>
-                        <a:t>14</a:t>
+                        <a:t>11</a:t>
                       </a:r>
                       <a:r>
-                        <a:rPr lang="es-ES_tradnl" sz="1500" b="1" baseline="0" smtClean="0">
+                        <a:rPr lang="es-ES_tradnl" sz="1500" b="1" baseline="0" dirty="0" smtClean="0">
                           <a:solidFill>
                             <a:schemeClr val="tx1">
                               <a:lumMod val="50000"/>
@@ -10233,7 +10084,7 @@
                             </a:schemeClr>
                           </a:solidFill>
                         </a:rPr>
-                        <a:t>/04</a:t>
+                        <a:t>/05</a:t>
                       </a:r>
                       <a:endParaRPr lang="en-US" sz="1500" b="1" dirty="0">
                         <a:solidFill>
@@ -10257,7 +10108,7 @@
                         <a:buNone/>
                       </a:pPr>
                       <a:r>
-                        <a:rPr lang="es-ES_tradnl" sz="1500" kern="1200" smtClean="0">
+                        <a:rPr lang="es-ES_tradnl" sz="1500" kern="1200" dirty="0" smtClean="0">
                           <a:solidFill>
                             <a:schemeClr val="tx1">
                               <a:lumMod val="50000"/>
@@ -10271,7 +10122,7 @@
                         <a:t>Práctica</a:t>
                       </a:r>
                       <a:r>
-                        <a:rPr lang="es-ES_tradnl" sz="1500" kern="1200" baseline="0" smtClean="0">
+                        <a:rPr lang="es-ES_tradnl" sz="1500" kern="1200" baseline="0" dirty="0" smtClean="0">
                           <a:solidFill>
                             <a:schemeClr val="tx1">
                               <a:lumMod val="50000"/>
@@ -10282,10 +10133,10 @@
                           <a:ea typeface="+mn-ea"/>
                           <a:cs typeface="+mn-cs"/>
                         </a:rPr>
-                        <a:t> </a:t>
+                        <a:t> de </a:t>
                       </a:r>
                       <a:r>
-                        <a:rPr lang="es-ES_tradnl" sz="1500" kern="1200" baseline="0" smtClean="0">
+                        <a:rPr lang="es-ES_tradnl" sz="1500" kern="1200" baseline="0" dirty="0" smtClean="0">
                           <a:solidFill>
                             <a:schemeClr val="tx1">
                               <a:lumMod val="50000"/>
@@ -10296,77 +10147,7 @@
                           <a:ea typeface="+mn-ea"/>
                           <a:cs typeface="+mn-cs"/>
                         </a:rPr>
-                        <a:t>de integraci</a:t>
-                      </a:r>
-                      <a:r>
-                        <a:rPr lang="en-US" sz="1500" kern="1200" baseline="0" smtClean="0">
-                          <a:solidFill>
-                            <a:schemeClr val="tx1">
-                              <a:lumMod val="50000"/>
-                              <a:lumOff val="50000"/>
-                            </a:schemeClr>
-                          </a:solidFill>
-                          <a:latin typeface="+mn-lt"/>
-                          <a:ea typeface="+mn-ea"/>
-                          <a:cs typeface="+mn-cs"/>
-                        </a:rPr>
-                        <a:t>ó</a:t>
-                      </a:r>
-                      <a:r>
-                        <a:rPr lang="es-ES_tradnl" sz="1500" kern="1200" baseline="0" smtClean="0">
-                          <a:solidFill>
-                            <a:schemeClr val="tx1">
-                              <a:lumMod val="50000"/>
-                              <a:lumOff val="50000"/>
-                            </a:schemeClr>
-                          </a:solidFill>
-                          <a:latin typeface="+mn-lt"/>
-                          <a:ea typeface="+mn-ea"/>
-                          <a:cs typeface="+mn-cs"/>
-                        </a:rPr>
-                        <a:t>n</a:t>
-                      </a:r>
-                      <a:r>
-                        <a:rPr lang="es-ES_tradnl" sz="1500" kern="1200" smtClean="0">
-                          <a:solidFill>
-                            <a:schemeClr val="tx1">
-                              <a:lumMod val="50000"/>
-                              <a:lumOff val="50000"/>
-                            </a:schemeClr>
-                          </a:solidFill>
-                          <a:latin typeface="+mn-lt"/>
-                          <a:ea typeface="+mn-ea"/>
-                          <a:cs typeface="+mn-cs"/>
-                        </a:rPr>
-                        <a:t> </a:t>
-                      </a:r>
-                      <a:r>
-                        <a:rPr lang="es-ES_tradnl" sz="1500" kern="1200" smtClean="0">
-                          <a:solidFill>
-                            <a:schemeClr val="tx1">
-                              <a:lumMod val="50000"/>
-                              <a:lumOff val="50000"/>
-                            </a:schemeClr>
-                          </a:solidFill>
-                          <a:latin typeface="+mn-lt"/>
-                          <a:ea typeface="+mn-ea"/>
-                          <a:cs typeface="+mn-cs"/>
-                        </a:rPr>
-                        <a:t>– </a:t>
-                      </a:r>
-                      <a:r>
-                        <a:rPr lang="es-ES_tradnl" sz="1500" kern="1200" smtClean="0">
-                          <a:solidFill>
-                            <a:schemeClr val="tx1">
-                              <a:lumMod val="50000"/>
-                              <a:lumOff val="50000"/>
-                            </a:schemeClr>
-                          </a:solidFill>
-                          <a:latin typeface="+mn-lt"/>
-                          <a:ea typeface="+mn-ea"/>
-                          <a:cs typeface="+mn-cs"/>
-                        </a:rPr>
-                        <a:t>4/4</a:t>
+                        <a:t>integración </a:t>
                       </a:r>
                       <a:endParaRPr lang="en-US" sz="1500" kern="1200" dirty="0" smtClean="0">
                         <a:solidFill>

</xml_diff>